<commit_message>
Minor edits to PPT
</commit_message>
<xml_diff>
--- a/CDI_Risk_Assessment_Model_Presentation_2021-02-02.pptx
+++ b/CDI_Risk_Assessment_Model_Presentation_2021-02-02.pptx
@@ -5,7 +5,7 @@
     <p:sldMasterId id="2147483648" r:id="rId1"/>
   </p:sldMasterIdLst>
   <p:notesMasterIdLst>
-    <p:notesMasterId r:id="rId19"/>
+    <p:notesMasterId r:id="rId22"/>
   </p:notesMasterIdLst>
   <p:sldIdLst>
     <p:sldId id="256" r:id="rId2"/>
@@ -22,9 +22,12 @@
     <p:sldId id="269" r:id="rId13"/>
     <p:sldId id="266" r:id="rId14"/>
     <p:sldId id="261" r:id="rId15"/>
-    <p:sldId id="271" r:id="rId16"/>
-    <p:sldId id="272" r:id="rId17"/>
-    <p:sldId id="273" r:id="rId18"/>
+    <p:sldId id="274" r:id="rId16"/>
+    <p:sldId id="277" r:id="rId17"/>
+    <p:sldId id="276" r:id="rId18"/>
+    <p:sldId id="271" r:id="rId19"/>
+    <p:sldId id="272" r:id="rId20"/>
+    <p:sldId id="273" r:id="rId21"/>
   </p:sldIdLst>
   <p:sldSz cx="12192000" cy="6858000"/>
   <p:notesSz cx="6858000" cy="9144000"/>
@@ -123,6 +126,11 @@
       </a:defRPr>
     </a:lvl9pPr>
   </p:defaultTextStyle>
+  <p:extLst>
+    <p:ext uri="{EFAFB233-063F-42B5-8137-9DF3F51BA10A}">
+      <p15:sldGuideLst xmlns:p15="http://schemas.microsoft.com/office/powerpoint/2012/main"/>
+    </p:ext>
+  </p:extLst>
 </p:presentation>
 </file>
 
@@ -5907,7 +5915,7 @@
           <a:p>
             <a:fld id="{7DF0BC48-3605-AA48-A780-A5BFEE79D8A8}" type="datetimeFigureOut">
               <a:rPr lang="en-US" smtClean="0"/>
-              <a:t>2/2/22</a:t>
+              <a:t>2/3/22</a:t>
             </a:fld>
             <a:endParaRPr lang="en-US"/>
           </a:p>
@@ -6220,7 +6228,7 @@
           <a:p>
             <a:r>
               <a:rPr lang="en-US" dirty="0"/>
-              <a:t>ABX, PPI, and GAS were coded as receipt of these UP TO ONE DAY PRIOR to </a:t>
+              <a:t>NOTE: ABX, PPI, and GAS were coded as receipt of these UP TO ONE DAY PRIOR to </a:t>
             </a:r>
             <a:r>
               <a:rPr lang="en-US" dirty="0" err="1"/>
@@ -6230,6 +6238,18 @@
               <a:rPr lang="en-US" dirty="0"/>
               <a:t> (date that culture was ordered – closest indicator of positive test result)</a:t>
             </a:r>
+          </a:p>
+          <a:p>
+            <a:endParaRPr lang="en-US" dirty="0"/>
+          </a:p>
+          <a:p>
+            <a:r>
+              <a:rPr lang="en-US" dirty="0"/>
+              <a:t>Variable names are in brackets </a:t>
+            </a:r>
+          </a:p>
+          <a:p>
+            <a:endParaRPr lang="en-US" dirty="0"/>
           </a:p>
         </p:txBody>
       </p:sp>
@@ -6622,7 +6642,7 @@
           <a:p>
             <a:fld id="{534DFDAF-047B-4D4D-BF48-E4B17ED25AA1}" type="slidenum">
               <a:rPr lang="en-US" smtClean="0"/>
-              <a:t>16</a:t>
+              <a:t>19</a:t>
             </a:fld>
             <a:endParaRPr lang="en-US"/>
           </a:p>
@@ -6687,6 +6707,27 @@
           <a:p>
             <a:r>
               <a:rPr lang="en-US" dirty="0"/>
+              <a:t>Brier score closest to 0 is best</a:t>
+            </a:r>
+          </a:p>
+          <a:p>
+            <a:endParaRPr lang="en-US" dirty="0"/>
+          </a:p>
+          <a:p>
+            <a:endParaRPr lang="en-US" dirty="0"/>
+          </a:p>
+          <a:p>
+            <a:r>
+              <a:rPr lang="en-US" dirty="0"/>
+              <a:t>CODE:</a:t>
+            </a:r>
+          </a:p>
+          <a:p>
+            <a:endParaRPr lang="en-US" dirty="0"/>
+          </a:p>
+          <a:p>
+            <a:r>
+              <a:rPr lang="en-US" dirty="0"/>
               <a:t>cat("Brier Score for M1:", round(</a:t>
             </a:r>
             <a:r>
@@ -6768,7 +6809,7 @@
           <a:p>
             <a:fld id="{534DFDAF-047B-4D4D-BF48-E4B17ED25AA1}" type="slidenum">
               <a:rPr lang="en-US" smtClean="0"/>
-              <a:t>17</a:t>
+              <a:t>20</a:t>
             </a:fld>
             <a:endParaRPr lang="en-US"/>
           </a:p>
@@ -6872,7 +6913,7 @@
             </a:pPr>
             <a:r>
               <a:rPr lang="en-US" dirty="0"/>
-              <a:t>Admit vs. discharge?</a:t>
+              <a:t>Admit vs. discharge? What does this mean?</a:t>
             </a:r>
           </a:p>
           <a:p>
@@ -6891,6 +6932,16 @@
             <a:r>
               <a:rPr lang="en-US" dirty="0"/>
               <a:t>)</a:t>
+            </a:r>
+          </a:p>
+          <a:p>
+            <a:pPr marL="628650" lvl="1" indent="-171450">
+              <a:buFont typeface="Arial" panose="020B0604020202020204" pitchFamily="34" charset="0"/>
+              <a:buChar char="•"/>
+            </a:pPr>
+            <a:r>
+              <a:rPr lang="en-US" dirty="0"/>
+              <a:t>Does this seem appropriate? </a:t>
             </a:r>
           </a:p>
           <a:p>
@@ -7971,7 +8022,7 @@
           <a:p>
             <a:fld id="{534DFDAF-047B-4D4D-BF48-E4B17ED25AA1}" type="slidenum">
               <a:rPr lang="en-US" smtClean="0"/>
-              <a:t>15</a:t>
+              <a:t>18</a:t>
             </a:fld>
             <a:endParaRPr lang="en-US"/>
           </a:p>
@@ -8137,7 +8188,7 @@
           <a:p>
             <a:fld id="{4E29CB56-124C-3743-9BD9-5BF3443329FD}" type="datetimeFigureOut">
               <a:rPr lang="en-US" smtClean="0"/>
-              <a:t>2/2/22</a:t>
+              <a:t>2/3/22</a:t>
             </a:fld>
             <a:endParaRPr lang="en-US"/>
           </a:p>
@@ -8335,7 +8386,7 @@
           <a:p>
             <a:fld id="{4E29CB56-124C-3743-9BD9-5BF3443329FD}" type="datetimeFigureOut">
               <a:rPr lang="en-US" smtClean="0"/>
-              <a:t>2/2/22</a:t>
+              <a:t>2/3/22</a:t>
             </a:fld>
             <a:endParaRPr lang="en-US"/>
           </a:p>
@@ -8543,7 +8594,7 @@
           <a:p>
             <a:fld id="{4E29CB56-124C-3743-9BD9-5BF3443329FD}" type="datetimeFigureOut">
               <a:rPr lang="en-US" smtClean="0"/>
-              <a:t>2/2/22</a:t>
+              <a:t>2/3/22</a:t>
             </a:fld>
             <a:endParaRPr lang="en-US"/>
           </a:p>
@@ -8741,7 +8792,7 @@
           <a:p>
             <a:fld id="{4E29CB56-124C-3743-9BD9-5BF3443329FD}" type="datetimeFigureOut">
               <a:rPr lang="en-US" smtClean="0"/>
-              <a:t>2/2/22</a:t>
+              <a:t>2/3/22</a:t>
             </a:fld>
             <a:endParaRPr lang="en-US"/>
           </a:p>
@@ -9016,7 +9067,7 @@
           <a:p>
             <a:fld id="{4E29CB56-124C-3743-9BD9-5BF3443329FD}" type="datetimeFigureOut">
               <a:rPr lang="en-US" smtClean="0"/>
-              <a:t>2/2/22</a:t>
+              <a:t>2/3/22</a:t>
             </a:fld>
             <a:endParaRPr lang="en-US"/>
           </a:p>
@@ -9281,7 +9332,7 @@
           <a:p>
             <a:fld id="{4E29CB56-124C-3743-9BD9-5BF3443329FD}" type="datetimeFigureOut">
               <a:rPr lang="en-US" smtClean="0"/>
-              <a:t>2/2/22</a:t>
+              <a:t>2/3/22</a:t>
             </a:fld>
             <a:endParaRPr lang="en-US"/>
           </a:p>
@@ -9693,7 +9744,7 @@
           <a:p>
             <a:fld id="{4E29CB56-124C-3743-9BD9-5BF3443329FD}" type="datetimeFigureOut">
               <a:rPr lang="en-US" smtClean="0"/>
-              <a:t>2/2/22</a:t>
+              <a:t>2/3/22</a:t>
             </a:fld>
             <a:endParaRPr lang="en-US"/>
           </a:p>
@@ -9834,7 +9885,7 @@
           <a:p>
             <a:fld id="{4E29CB56-124C-3743-9BD9-5BF3443329FD}" type="datetimeFigureOut">
               <a:rPr lang="en-US" smtClean="0"/>
-              <a:t>2/2/22</a:t>
+              <a:t>2/3/22</a:t>
             </a:fld>
             <a:endParaRPr lang="en-US"/>
           </a:p>
@@ -9947,7 +9998,7 @@
           <a:p>
             <a:fld id="{4E29CB56-124C-3743-9BD9-5BF3443329FD}" type="datetimeFigureOut">
               <a:rPr lang="en-US" smtClean="0"/>
-              <a:t>2/2/22</a:t>
+              <a:t>2/3/22</a:t>
             </a:fld>
             <a:endParaRPr lang="en-US"/>
           </a:p>
@@ -10258,7 +10309,7 @@
           <a:p>
             <a:fld id="{4E29CB56-124C-3743-9BD9-5BF3443329FD}" type="datetimeFigureOut">
               <a:rPr lang="en-US" smtClean="0"/>
-              <a:t>2/2/22</a:t>
+              <a:t>2/3/22</a:t>
             </a:fld>
             <a:endParaRPr lang="en-US"/>
           </a:p>
@@ -10546,7 +10597,7 @@
           <a:p>
             <a:fld id="{4E29CB56-124C-3743-9BD9-5BF3443329FD}" type="datetimeFigureOut">
               <a:rPr lang="en-US" smtClean="0"/>
-              <a:t>2/2/22</a:t>
+              <a:t>2/3/22</a:t>
             </a:fld>
             <a:endParaRPr lang="en-US"/>
           </a:p>
@@ -10787,7 +10838,7 @@
           <a:p>
             <a:fld id="{4E29CB56-124C-3743-9BD9-5BF3443329FD}" type="datetimeFigureOut">
               <a:rPr lang="en-US" smtClean="0"/>
-              <a:t>2/2/22</a:t>
+              <a:t>2/3/22</a:t>
             </a:fld>
             <a:endParaRPr lang="en-US"/>
           </a:p>
@@ -11476,7 +11527,14 @@
             <a:pPr algn="l"/>
             <a:r>
               <a:rPr lang="en-US" sz="2800" dirty="0"/>
-              <a:t>February 2, 2022</a:t>
+              <a:t>Steph Reynolds, MPH</a:t>
+            </a:r>
+          </a:p>
+          <a:p>
+            <a:pPr algn="l"/>
+            <a:r>
+              <a:rPr lang="en-US" sz="2800" dirty="0"/>
+              <a:t>February 3, 2022</a:t>
             </a:r>
           </a:p>
         </p:txBody>
@@ -11803,7 +11861,7 @@
         <p:spPr>
           <a:xfrm>
             <a:off x="8045753" y="2438401"/>
-            <a:ext cx="3667036" cy="3779520"/>
+            <a:ext cx="3402105" cy="3779520"/>
           </a:xfrm>
         </p:spPr>
         <p:txBody>
@@ -11816,7 +11874,7 @@
               <a:buNone/>
             </a:pPr>
             <a:r>
-              <a:rPr lang="en-US" sz="1800" kern="1200" dirty="0">
+              <a:rPr lang="en-US" sz="2000" kern="1200" dirty="0">
                 <a:latin typeface="+mn-lt"/>
                 <a:ea typeface="+mn-ea"/>
                 <a:cs typeface="+mn-cs"/>
@@ -11829,11 +11887,11 @@
               <a:buNone/>
             </a:pPr>
             <a:r>
-              <a:rPr lang="en-US" sz="1800" dirty="0"/>
-              <a:t>	 </a:t>
-            </a:r>
-            <a:r>
-              <a:rPr lang="en-US" sz="1800" kern="1200" dirty="0">
+              <a:rPr lang="en-US" sz="2000" dirty="0"/>
+              <a:t>	  </a:t>
+            </a:r>
+            <a:r>
+              <a:rPr lang="en-US" sz="2000" kern="1200" dirty="0">
                 <a:latin typeface="+mn-lt"/>
                 <a:ea typeface="+mn-ea"/>
                 <a:cs typeface="+mn-cs"/>
@@ -11846,16 +11904,16 @@
               <a:buNone/>
             </a:pPr>
             <a:r>
-              <a:rPr lang="en-US" sz="1800" dirty="0"/>
+              <a:rPr lang="en-US" sz="2000" dirty="0"/>
               <a:t>	</a:t>
             </a:r>
             <a:r>
-              <a:rPr lang="en-US" sz="1800" kern="1200" dirty="0">
+              <a:rPr lang="en-US" sz="2000" kern="1200" dirty="0">
                 <a:latin typeface="+mn-lt"/>
                 <a:ea typeface="+mn-ea"/>
                 <a:cs typeface="+mn-cs"/>
               </a:rPr>
-              <a:t> GAS + </a:t>
+              <a:t>  GAS + </a:t>
             </a:r>
           </a:p>
           <a:p>
@@ -11863,26 +11921,26 @@
               <a:buNone/>
             </a:pPr>
             <a:r>
-              <a:rPr lang="en-US" sz="1800" dirty="0"/>
+              <a:rPr lang="en-US" sz="2000" dirty="0"/>
               <a:t>	</a:t>
             </a:r>
             <a:r>
-              <a:rPr lang="en-US" sz="1800" kern="1200" dirty="0">
+              <a:rPr lang="en-US" sz="2000" kern="1200" dirty="0">
                 <a:latin typeface="+mn-lt"/>
                 <a:ea typeface="+mn-ea"/>
                 <a:cs typeface="+mn-cs"/>
               </a:rPr>
-              <a:t> ABX</a:t>
+              <a:t>  ABX</a:t>
             </a:r>
           </a:p>
         </p:txBody>
       </p:sp>
       <p:sp>
         <p:nvSpPr>
-          <p:cNvPr id="18" name="Right Bracket 17">
+          <p:cNvPr id="8" name="Rounded Rectangle 7">
             <a:extLst>
               <a:ext uri="{FF2B5EF4-FFF2-40B4-BE49-F238E27FC236}">
-                <a16:creationId xmlns:a16="http://schemas.microsoft.com/office/drawing/2014/main" id="{3B134C40-D1DB-EA42-B441-1E067B40CA69}"/>
+                <a16:creationId xmlns:a16="http://schemas.microsoft.com/office/drawing/2014/main" id="{1F9002A7-8AA7-F849-888C-E8A6D73FF8C5}"/>
               </a:ext>
             </a:extLst>
           </p:cNvPr>
@@ -11891,26 +11949,80 @@
         </p:nvSpPr>
         <p:spPr>
           <a:xfrm>
-            <a:off x="5857103" y="2117125"/>
-            <a:ext cx="111211" cy="1241854"/>
+            <a:off x="622852" y="1670249"/>
+            <a:ext cx="5353878" cy="1758751"/>
           </a:xfrm>
-          <a:prstGeom prst="rightBracket">
+          <a:prstGeom prst="roundRect">
             <a:avLst/>
           </a:prstGeom>
-          <a:ln w="57150"/>
+          <a:noFill/>
+          <a:ln w="38100">
+            <a:solidFill>
+              <a:schemeClr val="accent4"/>
+            </a:solidFill>
+            <a:prstDash val="solid"/>
+          </a:ln>
         </p:spPr>
         <p:style>
-          <a:lnRef idx="1">
-            <a:schemeClr val="accent4"/>
+          <a:lnRef idx="2">
+            <a:schemeClr val="accent1">
+              <a:shade val="50000"/>
+            </a:schemeClr>
           </a:lnRef>
-          <a:fillRef idx="0">
+          <a:fillRef idx="1">
+            <a:schemeClr val="accent1"/>
+          </a:fillRef>
+          <a:effectRef idx="0">
+            <a:schemeClr val="accent1"/>
+          </a:effectRef>
+          <a:fontRef idx="minor">
+            <a:schemeClr val="lt1"/>
+          </a:fontRef>
+        </p:style>
+        <p:txBody>
+          <a:bodyPr rtlCol="0" anchor="ctr"/>
+          <a:lstStyle/>
+          <a:p>
+            <a:pPr algn="ctr"/>
+            <a:endParaRPr lang="en-US"/>
+          </a:p>
+        </p:txBody>
+      </p:sp>
+      <p:sp>
+        <p:nvSpPr>
+          <p:cNvPr id="10" name="Right Arrow 9">
+            <a:extLst>
+              <a:ext uri="{FF2B5EF4-FFF2-40B4-BE49-F238E27FC236}">
+                <a16:creationId xmlns:a16="http://schemas.microsoft.com/office/drawing/2014/main" id="{587C1ED3-D232-1C4A-B396-4532FB7434A7}"/>
+              </a:ext>
+            </a:extLst>
+          </p:cNvPr>
+          <p:cNvSpPr/>
+          <p:nvPr/>
+        </p:nvSpPr>
+        <p:spPr>
+          <a:xfrm>
+            <a:off x="77476" y="4929972"/>
+            <a:ext cx="598385" cy="257779"/>
+          </a:xfrm>
+          <a:prstGeom prst="rightArrow">
+            <a:avLst/>
+          </a:prstGeom>
+        </p:spPr>
+        <p:style>
+          <a:lnRef idx="2">
+            <a:schemeClr val="accent4">
+              <a:shade val="50000"/>
+            </a:schemeClr>
+          </a:lnRef>
+          <a:fillRef idx="1">
             <a:schemeClr val="accent4"/>
           </a:fillRef>
           <a:effectRef idx="0">
             <a:schemeClr val="accent4"/>
           </a:effectRef>
           <a:fontRef idx="minor">
-            <a:schemeClr val="tx1"/>
+            <a:schemeClr val="lt1"/>
           </a:fontRef>
         </p:style>
         <p:txBody>
@@ -12257,7 +12369,7 @@
               <a:buNone/>
             </a:pPr>
             <a:r>
-              <a:rPr lang="en-US" sz="1800" kern="1200" dirty="0">
+              <a:rPr lang="en-US" sz="2000" kern="1200" dirty="0">
                 <a:latin typeface="+mn-lt"/>
                 <a:ea typeface="+mn-ea"/>
                 <a:cs typeface="+mn-cs"/>
@@ -12270,11 +12382,11 @@
               <a:buNone/>
             </a:pPr>
             <a:r>
-              <a:rPr lang="en-US" sz="1800" dirty="0"/>
+              <a:rPr lang="en-US" sz="2000" dirty="0"/>
               <a:t>	  </a:t>
             </a:r>
             <a:r>
-              <a:rPr lang="en-US" sz="1800" kern="1200" dirty="0">
+              <a:rPr lang="en-US" sz="2000" kern="1200" dirty="0">
                 <a:latin typeface="+mn-lt"/>
                 <a:ea typeface="+mn-ea"/>
                 <a:cs typeface="+mn-cs"/>
@@ -12287,21 +12399,21 @@
               <a:buNone/>
             </a:pPr>
             <a:r>
-              <a:rPr lang="en-US" sz="1800" kern="1200" dirty="0">
+              <a:rPr lang="en-US" sz="2000" kern="1200" dirty="0">
                 <a:latin typeface="+mn-lt"/>
                 <a:ea typeface="+mn-ea"/>
                 <a:cs typeface="+mn-cs"/>
               </a:rPr>
               <a:t>	  PPI + </a:t>
             </a:r>
-            <a:endParaRPr lang="en-US" sz="1800" dirty="0"/>
+            <a:endParaRPr lang="en-US" sz="2000" dirty="0"/>
           </a:p>
           <a:p>
             <a:pPr marL="0" indent="0">
               <a:buNone/>
             </a:pPr>
             <a:r>
-              <a:rPr lang="en-US" sz="1800" kern="1200" dirty="0">
+              <a:rPr lang="en-US" sz="2000" kern="1200" dirty="0">
                 <a:latin typeface="+mn-lt"/>
                 <a:ea typeface="+mn-ea"/>
                 <a:cs typeface="+mn-cs"/>
@@ -12313,10 +12425,10 @@
       </p:sp>
       <p:sp>
         <p:nvSpPr>
-          <p:cNvPr id="27" name="Right Bracket 26">
+          <p:cNvPr id="8" name="Rounded Rectangle 7">
             <a:extLst>
               <a:ext uri="{FF2B5EF4-FFF2-40B4-BE49-F238E27FC236}">
-                <a16:creationId xmlns:a16="http://schemas.microsoft.com/office/drawing/2014/main" id="{43983DA7-2A47-2B49-BAF9-4470428D2E49}"/>
+                <a16:creationId xmlns:a16="http://schemas.microsoft.com/office/drawing/2014/main" id="{5FD215D5-3206-8C43-9CC3-BCBEC7B3BDCD}"/>
               </a:ext>
             </a:extLst>
           </p:cNvPr>
@@ -12325,26 +12437,80 @@
         </p:nvSpPr>
         <p:spPr>
           <a:xfrm>
-            <a:off x="5782962" y="2150075"/>
-            <a:ext cx="135925" cy="1171833"/>
+            <a:off x="622852" y="1670249"/>
+            <a:ext cx="5353878" cy="1758751"/>
           </a:xfrm>
-          <a:prstGeom prst="rightBracket">
+          <a:prstGeom prst="roundRect">
             <a:avLst/>
           </a:prstGeom>
-          <a:ln w="57150"/>
+          <a:noFill/>
+          <a:ln w="38100">
+            <a:solidFill>
+              <a:schemeClr val="accent4"/>
+            </a:solidFill>
+            <a:prstDash val="solid"/>
+          </a:ln>
         </p:spPr>
         <p:style>
-          <a:lnRef idx="1">
-            <a:schemeClr val="accent4"/>
+          <a:lnRef idx="2">
+            <a:schemeClr val="accent1">
+              <a:shade val="50000"/>
+            </a:schemeClr>
           </a:lnRef>
-          <a:fillRef idx="0">
+          <a:fillRef idx="1">
+            <a:schemeClr val="accent1"/>
+          </a:fillRef>
+          <a:effectRef idx="0">
+            <a:schemeClr val="accent1"/>
+          </a:effectRef>
+          <a:fontRef idx="minor">
+            <a:schemeClr val="lt1"/>
+          </a:fontRef>
+        </p:style>
+        <p:txBody>
+          <a:bodyPr rtlCol="0" anchor="ctr"/>
+          <a:lstStyle/>
+          <a:p>
+            <a:pPr algn="ctr"/>
+            <a:endParaRPr lang="en-US"/>
+          </a:p>
+        </p:txBody>
+      </p:sp>
+      <p:sp>
+        <p:nvSpPr>
+          <p:cNvPr id="9" name="Right Arrow 8">
+            <a:extLst>
+              <a:ext uri="{FF2B5EF4-FFF2-40B4-BE49-F238E27FC236}">
+                <a16:creationId xmlns:a16="http://schemas.microsoft.com/office/drawing/2014/main" id="{0E0865E7-7A96-9F43-A9BD-02A2C8E74A4F}"/>
+              </a:ext>
+            </a:extLst>
+          </p:cNvPr>
+          <p:cNvSpPr/>
+          <p:nvPr/>
+        </p:nvSpPr>
+        <p:spPr>
+          <a:xfrm>
+            <a:off x="145757" y="4907229"/>
+            <a:ext cx="598385" cy="257779"/>
+          </a:xfrm>
+          <a:prstGeom prst="rightArrow">
+            <a:avLst/>
+          </a:prstGeom>
+        </p:spPr>
+        <p:style>
+          <a:lnRef idx="2">
+            <a:schemeClr val="accent4">
+              <a:shade val="50000"/>
+            </a:schemeClr>
+          </a:lnRef>
+          <a:fillRef idx="1">
             <a:schemeClr val="accent4"/>
           </a:fillRef>
           <a:effectRef idx="0">
             <a:schemeClr val="accent4"/>
           </a:effectRef>
           <a:fontRef idx="minor">
-            <a:schemeClr val="tx1"/>
+            <a:schemeClr val="lt1"/>
           </a:fontRef>
         </p:style>
         <p:txBody>
@@ -12691,7 +12857,7 @@
               <a:buNone/>
             </a:pPr>
             <a:r>
-              <a:rPr lang="en-US" sz="1800" kern="1200">
+              <a:rPr lang="en-US" sz="2000" kern="1200" dirty="0">
                 <a:latin typeface="+mn-lt"/>
                 <a:ea typeface="+mn-ea"/>
                 <a:cs typeface="+mn-cs"/>
@@ -12704,11 +12870,11 @@
               <a:buNone/>
             </a:pPr>
             <a:r>
-              <a:rPr lang="en-US" sz="1800"/>
+              <a:rPr lang="en-US" sz="2000" dirty="0"/>
               <a:t>	  </a:t>
             </a:r>
             <a:r>
-              <a:rPr lang="en-US" sz="1800" kern="1200">
+              <a:rPr lang="en-US" sz="2000" kern="1200" dirty="0">
                 <a:latin typeface="+mn-lt"/>
                 <a:ea typeface="+mn-ea"/>
                 <a:cs typeface="+mn-cs"/>
@@ -12721,11 +12887,11 @@
               <a:buNone/>
             </a:pPr>
             <a:r>
-              <a:rPr lang="en-US" sz="1800"/>
+              <a:rPr lang="en-US" sz="2000" dirty="0"/>
               <a:t>	  </a:t>
             </a:r>
             <a:r>
-              <a:rPr lang="en-US" sz="1800" kern="1200">
+              <a:rPr lang="en-US" sz="2000" kern="1200" dirty="0">
                 <a:latin typeface="+mn-lt"/>
                 <a:ea typeface="+mn-ea"/>
                 <a:cs typeface="+mn-cs"/>
@@ -12737,10 +12903,10 @@
       </p:sp>
       <p:sp>
         <p:nvSpPr>
-          <p:cNvPr id="21" name="Right Bracket 20">
+          <p:cNvPr id="8" name="Rounded Rectangle 7">
             <a:extLst>
               <a:ext uri="{FF2B5EF4-FFF2-40B4-BE49-F238E27FC236}">
-                <a16:creationId xmlns:a16="http://schemas.microsoft.com/office/drawing/2014/main" id="{559E9B28-273E-124A-BF92-0B910F97003C}"/>
+                <a16:creationId xmlns:a16="http://schemas.microsoft.com/office/drawing/2014/main" id="{805951EB-0807-9445-B170-ED323ECED894}"/>
               </a:ext>
             </a:extLst>
           </p:cNvPr>
@@ -12749,26 +12915,80 @@
         </p:nvSpPr>
         <p:spPr>
           <a:xfrm>
-            <a:off x="5795319" y="2223493"/>
-            <a:ext cx="123567" cy="976908"/>
+            <a:off x="622852" y="1670249"/>
+            <a:ext cx="5353878" cy="1758751"/>
           </a:xfrm>
-          <a:prstGeom prst="rightBracket">
+          <a:prstGeom prst="roundRect">
             <a:avLst/>
           </a:prstGeom>
-          <a:ln w="57150"/>
+          <a:noFill/>
+          <a:ln w="38100">
+            <a:solidFill>
+              <a:schemeClr val="accent4"/>
+            </a:solidFill>
+            <a:prstDash val="solid"/>
+          </a:ln>
         </p:spPr>
         <p:style>
-          <a:lnRef idx="1">
-            <a:schemeClr val="accent4"/>
+          <a:lnRef idx="2">
+            <a:schemeClr val="accent1">
+              <a:shade val="50000"/>
+            </a:schemeClr>
           </a:lnRef>
-          <a:fillRef idx="0">
+          <a:fillRef idx="1">
+            <a:schemeClr val="accent1"/>
+          </a:fillRef>
+          <a:effectRef idx="0">
+            <a:schemeClr val="accent1"/>
+          </a:effectRef>
+          <a:fontRef idx="minor">
+            <a:schemeClr val="lt1"/>
+          </a:fontRef>
+        </p:style>
+        <p:txBody>
+          <a:bodyPr rtlCol="0" anchor="ctr"/>
+          <a:lstStyle/>
+          <a:p>
+            <a:pPr algn="ctr"/>
+            <a:endParaRPr lang="en-US"/>
+          </a:p>
+        </p:txBody>
+      </p:sp>
+      <p:sp>
+        <p:nvSpPr>
+          <p:cNvPr id="9" name="Right Arrow 8">
+            <a:extLst>
+              <a:ext uri="{FF2B5EF4-FFF2-40B4-BE49-F238E27FC236}">
+                <a16:creationId xmlns:a16="http://schemas.microsoft.com/office/drawing/2014/main" id="{4A1217F3-FECD-BC49-AB7A-BC1292F0C4B7}"/>
+              </a:ext>
+            </a:extLst>
+          </p:cNvPr>
+          <p:cNvSpPr/>
+          <p:nvPr/>
+        </p:nvSpPr>
+        <p:spPr>
+          <a:xfrm>
+            <a:off x="145536" y="4844253"/>
+            <a:ext cx="598385" cy="257779"/>
+          </a:xfrm>
+          <a:prstGeom prst="rightArrow">
+            <a:avLst/>
+          </a:prstGeom>
+        </p:spPr>
+        <p:style>
+          <a:lnRef idx="2">
+            <a:schemeClr val="accent4">
+              <a:shade val="50000"/>
+            </a:schemeClr>
+          </a:lnRef>
+          <a:fillRef idx="1">
             <a:schemeClr val="accent4"/>
           </a:fillRef>
           <a:effectRef idx="0">
             <a:schemeClr val="accent4"/>
           </a:effectRef>
           <a:fontRef idx="minor">
-            <a:schemeClr val="tx1"/>
+            <a:schemeClr val="lt1"/>
           </a:fontRef>
         </p:style>
         <p:txBody>
@@ -13281,14 +13501,14 @@
           <p:nvPr>
             <p:extLst>
               <p:ext uri="{D42A27DB-BD31-4B8C-83A1-F6EECF244321}">
-                <p14:modId xmlns:p14="http://schemas.microsoft.com/office/powerpoint/2010/main" val="3350102272"/>
+                <p14:modId xmlns:p14="http://schemas.microsoft.com/office/powerpoint/2010/main" val="1628024182"/>
               </p:ext>
             </p:extLst>
           </p:nvPr>
         </p:nvGraphicFramePr>
         <p:xfrm>
-          <a:off x="2445357" y="1706686"/>
-          <a:ext cx="8169097" cy="3112448"/>
+          <a:off x="1378227" y="1670241"/>
+          <a:ext cx="9841063" cy="3215474"/>
         </p:xfrm>
         <a:graphic>
           <a:graphicData uri="http://schemas.openxmlformats.org/drawingml/2006/table">
@@ -13297,28 +13517,28 @@
                 <a:tableStyleId>{91EBBBCC-DAD2-459C-BE2E-F6DE35CF9A28}</a:tableStyleId>
               </a:tblPr>
               <a:tblGrid>
-                <a:gridCol w="857719">
+                <a:gridCol w="1033268">
                   <a:extLst>
                     <a:ext uri="{9D8B030D-6E8A-4147-A177-3AD203B41FA5}">
                       <a16:colId xmlns:a16="http://schemas.microsoft.com/office/drawing/2014/main" val="829638609"/>
                     </a:ext>
                   </a:extLst>
                 </a:gridCol>
-                <a:gridCol w="4487932">
+                <a:gridCol w="6202418">
                   <a:extLst>
                     <a:ext uri="{9D8B030D-6E8A-4147-A177-3AD203B41FA5}">
                       <a16:colId xmlns:a16="http://schemas.microsoft.com/office/drawing/2014/main" val="3954282939"/>
                     </a:ext>
                   </a:extLst>
                 </a:gridCol>
-                <a:gridCol w="1411723">
+                <a:gridCol w="1457739">
                   <a:extLst>
                     <a:ext uri="{9D8B030D-6E8A-4147-A177-3AD203B41FA5}">
                       <a16:colId xmlns:a16="http://schemas.microsoft.com/office/drawing/2014/main" val="3899427863"/>
                     </a:ext>
                   </a:extLst>
                 </a:gridCol>
-                <a:gridCol w="1411723">
+                <a:gridCol w="1147638">
                   <a:extLst>
                     <a:ext uri="{9D8B030D-6E8A-4147-A177-3AD203B41FA5}">
                       <a16:colId xmlns:a16="http://schemas.microsoft.com/office/drawing/2014/main" val="1037656271"/>
@@ -13326,14 +13546,14 @@
                   </a:extLst>
                 </a:gridCol>
               </a:tblGrid>
-              <a:tr h="393776">
+              <a:tr h="400783">
                 <a:tc>
                   <a:txBody>
                     <a:bodyPr/>
                     <a:lstStyle/>
                     <a:p>
                       <a:r>
-                        <a:rPr lang="en-US" dirty="0"/>
+                        <a:rPr lang="en-US" sz="2000" dirty="0"/>
                         <a:t>Model</a:t>
                       </a:r>
                     </a:p>
@@ -13346,7 +13566,7 @@
                     <a:lstStyle/>
                     <a:p>
                       <a:r>
-                        <a:rPr lang="en-US" dirty="0"/>
+                        <a:rPr lang="en-US" sz="2000" dirty="0"/>
                         <a:t>Formula</a:t>
                       </a:r>
                     </a:p>
@@ -13359,11 +13579,11 @@
                     <a:lstStyle/>
                     <a:p>
                       <a:r>
-                        <a:rPr lang="en-US" baseline="0" dirty="0" err="1"/>
+                        <a:rPr lang="en-US" sz="2000" baseline="0" dirty="0" err="1"/>
                         <a:t>Tjur’s</a:t>
                       </a:r>
                       <a:r>
-                        <a:rPr lang="en-US" baseline="0" dirty="0"/>
+                        <a:rPr lang="en-US" sz="2000" baseline="0" dirty="0"/>
                         <a:t> R2</a:t>
                       </a:r>
                     </a:p>
@@ -13376,7 +13596,7 @@
                     <a:lstStyle/>
                     <a:p>
                       <a:r>
-                        <a:rPr lang="en-US" baseline="0" dirty="0"/>
+                        <a:rPr lang="en-US" sz="2000" baseline="0" dirty="0"/>
                         <a:t>AIC</a:t>
                       </a:r>
                     </a:p>
@@ -13389,14 +13609,14 @@
                   </a:ext>
                 </a:extLst>
               </a:tr>
-              <a:tr h="679668">
+              <a:tr h="709077">
                 <a:tc>
                   <a:txBody>
                     <a:bodyPr/>
                     <a:lstStyle/>
                     <a:p>
                       <a:r>
-                        <a:rPr lang="en-US" dirty="0"/>
+                        <a:rPr lang="en-US" sz="2000" dirty="0"/>
                         <a:t>m1</a:t>
                       </a:r>
                     </a:p>
@@ -13426,7 +13646,7 @@
                         <a:defRPr/>
                       </a:pPr>
                       <a:r>
-                        <a:rPr lang="en-US" dirty="0"/>
+                        <a:rPr lang="en-US" sz="2000" dirty="0"/>
                         <a:t>HACDIF ~ readmit + age_gte_65 + ABX + PPI + GAS</a:t>
                       </a:r>
                     </a:p>
@@ -13439,7 +13659,7 @@
                     <a:lstStyle/>
                     <a:p>
                       <a:r>
-                        <a:rPr lang="en-US" dirty="0"/>
+                        <a:rPr lang="en-US" sz="2000" dirty="0"/>
                         <a:t>0.163</a:t>
                       </a:r>
                     </a:p>
@@ -13452,7 +13672,7 @@
                     <a:lstStyle/>
                     <a:p>
                       <a:r>
-                        <a:rPr lang="en-US" dirty="0"/>
+                        <a:rPr lang="en-US" sz="2000" dirty="0"/>
                         <a:t>739.6</a:t>
                       </a:r>
                     </a:p>
@@ -13465,14 +13685,14 @@
                   </a:ext>
                 </a:extLst>
               </a:tr>
-              <a:tr h="679668">
+              <a:tr h="709077">
                 <a:tc>
                   <a:txBody>
                     <a:bodyPr/>
                     <a:lstStyle/>
                     <a:p>
                       <a:r>
-                        <a:rPr lang="en-US" dirty="0"/>
+                        <a:rPr lang="en-US" sz="2000" dirty="0"/>
                         <a:t>m2</a:t>
                       </a:r>
                     </a:p>
@@ -13502,7 +13722,7 @@
                         <a:defRPr/>
                       </a:pPr>
                       <a:r>
-                        <a:rPr lang="en-US" dirty="0"/>
+                        <a:rPr lang="en-US" sz="2000" dirty="0"/>
                         <a:t>HACDIF ~ readmit + age_gte_65 + ABX + GAS</a:t>
                       </a:r>
                     </a:p>
@@ -13515,7 +13735,7 @@
                     <a:lstStyle/>
                     <a:p>
                       <a:r>
-                        <a:rPr lang="en-US" dirty="0"/>
+                        <a:rPr lang="en-US" sz="2000" dirty="0"/>
                         <a:t>0.157</a:t>
                       </a:r>
                     </a:p>
@@ -13545,12 +13765,12 @@
                         <a:defRPr/>
                       </a:pPr>
                       <a:r>
-                        <a:rPr lang="en-US" dirty="0"/>
+                        <a:rPr lang="en-US" sz="2000" dirty="0"/>
                         <a:t>740.1</a:t>
                       </a:r>
                     </a:p>
                     <a:p>
-                      <a:endParaRPr lang="en-US" dirty="0"/>
+                      <a:endParaRPr lang="en-US" sz="2000" dirty="0"/>
                     </a:p>
                   </a:txBody>
                   <a:tcPr/>
@@ -13561,14 +13781,14 @@
                   </a:ext>
                 </a:extLst>
               </a:tr>
-              <a:tr h="679668">
+              <a:tr h="709077">
                 <a:tc>
                   <a:txBody>
                     <a:bodyPr/>
                     <a:lstStyle/>
                     <a:p>
                       <a:r>
-                        <a:rPr lang="en-US" dirty="0"/>
+                        <a:rPr lang="en-US" sz="2000" dirty="0"/>
                         <a:t>m3</a:t>
                       </a:r>
                     </a:p>
@@ -13598,7 +13818,7 @@
                         <a:defRPr/>
                       </a:pPr>
                       <a:r>
-                        <a:rPr lang="en-US" dirty="0"/>
+                        <a:rPr lang="en-US" sz="2000" dirty="0"/>
                         <a:t>HACDIF ~ readmit + age_gte_65 + ABX +  PPI</a:t>
                       </a:r>
                     </a:p>
@@ -13611,7 +13831,7 @@
                     <a:lstStyle/>
                     <a:p>
                       <a:r>
-                        <a:rPr lang="en-US" dirty="0"/>
+                        <a:rPr lang="en-US" sz="2000" dirty="0"/>
                         <a:t>0.154</a:t>
                       </a:r>
                     </a:p>
@@ -13641,12 +13861,12 @@
                         <a:defRPr/>
                       </a:pPr>
                       <a:r>
-                        <a:rPr lang="en-US" dirty="0"/>
+                        <a:rPr lang="en-US" sz="2000" dirty="0"/>
                         <a:t>766.3</a:t>
                       </a:r>
                     </a:p>
                     <a:p>
-                      <a:endParaRPr lang="en-US" dirty="0"/>
+                      <a:endParaRPr lang="en-US" sz="2000" dirty="0"/>
                     </a:p>
                   </a:txBody>
                   <a:tcPr/>
@@ -13657,14 +13877,14 @@
                   </a:ext>
                 </a:extLst>
               </a:tr>
-              <a:tr h="679668">
+              <a:tr h="687460">
                 <a:tc>
                   <a:txBody>
                     <a:bodyPr/>
                     <a:lstStyle/>
                     <a:p>
                       <a:r>
-                        <a:rPr lang="en-US" dirty="0"/>
+                        <a:rPr lang="en-US" sz="2000" dirty="0"/>
                         <a:t>m4</a:t>
                       </a:r>
                     </a:p>
@@ -13677,7 +13897,7 @@
                     <a:lstStyle/>
                     <a:p>
                       <a:r>
-                        <a:rPr lang="en-US" dirty="0"/>
+                        <a:rPr lang="en-US" sz="2000" dirty="0"/>
                         <a:t>HACDIF ~ readmit + age_gte_65 + ABX</a:t>
                       </a:r>
                     </a:p>
@@ -13690,7 +13910,7 @@
                     <a:lstStyle/>
                     <a:p>
                       <a:r>
-                        <a:rPr lang="en-US" dirty="0"/>
+                        <a:rPr lang="en-US" sz="2000" dirty="0"/>
                         <a:t>0.150</a:t>
                       </a:r>
                     </a:p>
@@ -13720,7 +13940,7 @@
                         <a:defRPr/>
                       </a:pPr>
                       <a:r>
-                        <a:rPr lang="en-US" dirty="0"/>
+                        <a:rPr lang="en-US" sz="2000" dirty="0"/>
                         <a:t>765.9</a:t>
                       </a:r>
                     </a:p>
@@ -14271,26 +14491,37 @@
           <a:lstStyle/>
           <a:p>
             <a:r>
-              <a:rPr lang="en-US" sz="2400"/>
+              <a:rPr lang="en-US" sz="2400" dirty="0"/>
               <a:t>ABX – Only data on inpatient use</a:t>
             </a:r>
           </a:p>
           <a:p>
             <a:r>
-              <a:rPr lang="en-US" sz="2400"/>
+              <a:rPr lang="en-US" sz="2400" dirty="0"/>
               <a:t>DBM – Only data on Covid-positive patients; excluded from current model</a:t>
             </a:r>
           </a:p>
           <a:p>
             <a:r>
-              <a:rPr lang="en-US" sz="2400"/>
-              <a:t>ED_dispo – Excluded from current model since need to clarify what it means and if it’s appropriate to included </a:t>
-            </a:r>
-          </a:p>
-          <a:p>
-            <a:r>
-              <a:rPr lang="en-US" sz="2400"/>
-              <a:t>GAS and ABX are moderately correlated with each other… exclude one in final model? </a:t>
+              <a:rPr lang="en-US" sz="2400" dirty="0" err="1"/>
+              <a:t>ED_dispo</a:t>
+            </a:r>
+            <a:r>
+              <a:rPr lang="en-US" sz="2400" dirty="0"/>
+              <a:t> – Excluded from current model since need to clarify what it means and if it’s appropriate to included </a:t>
+            </a:r>
+          </a:p>
+          <a:p>
+            <a:r>
+              <a:rPr lang="en-US" sz="2400" dirty="0"/>
+              <a:t>GAS and ABX are moderately correlated with each other</a:t>
+            </a:r>
+          </a:p>
+          <a:p>
+            <a:pPr lvl="1"/>
+            <a:r>
+              <a:rPr lang="en-US" sz="2000" dirty="0"/>
+              <a:t>Should we exclude GAS (as in m4)?</a:t>
             </a:r>
           </a:p>
         </p:txBody>
@@ -14309,6 +14540,530 @@
 </file>
 
 <file path=ppt/slides/slide15.xml><?xml version="1.0" encoding="utf-8"?>
+<p:sld xmlns:a="http://schemas.openxmlformats.org/drawingml/2006/main" xmlns:r="http://schemas.openxmlformats.org/officeDocument/2006/relationships" xmlns:p="http://schemas.openxmlformats.org/presentationml/2006/main">
+  <p:cSld>
+    <p:bg>
+      <p:bgPr>
+        <a:solidFill>
+          <a:schemeClr val="bg1"/>
+        </a:solidFill>
+        <a:effectLst/>
+      </p:bgPr>
+    </p:bg>
+    <p:spTree>
+      <p:nvGrpSpPr>
+        <p:cNvPr id="1" name=""/>
+        <p:cNvGrpSpPr/>
+        <p:nvPr/>
+      </p:nvGrpSpPr>
+      <p:grpSpPr>
+        <a:xfrm>
+          <a:off x="0" y="0"/>
+          <a:ext cx="0" cy="0"/>
+          <a:chOff x="0" y="0"/>
+          <a:chExt cx="0" cy="0"/>
+        </a:xfrm>
+      </p:grpSpPr>
+      <p:sp useBgFill="1">
+        <p:nvSpPr>
+          <p:cNvPr id="8" name="Rectangle 7">
+            <a:extLst>
+              <a:ext uri="{FF2B5EF4-FFF2-40B4-BE49-F238E27FC236}">
+                <a16:creationId xmlns:a16="http://schemas.microsoft.com/office/drawing/2014/main" id="{DBF61EA3-B236-439E-9C0B-340980D56BEE}"/>
+              </a:ext>
+              <a:ext uri="{C183D7F6-B498-43B3-948B-1728B52AA6E4}">
+                <adec:decorative xmlns:adec="http://schemas.microsoft.com/office/drawing/2017/decorative" val="1"/>
+              </a:ext>
+            </a:extLst>
+          </p:cNvPr>
+          <p:cNvSpPr>
+            <a:spLocks noGrp="1" noRot="1" noChangeAspect="1" noMove="1" noResize="1" noEditPoints="1" noAdjustHandles="1" noChangeArrowheads="1" noChangeShapeType="1" noTextEdit="1"/>
+          </p:cNvSpPr>
+          <p:nvPr>
+            <p:extLst>
+              <p:ext uri="{386F3935-93C4-4BCD-93E2-E3B085C9AB24}">
+                <p16:designElem xmlns:p16="http://schemas.microsoft.com/office/powerpoint/2015/main" val="1"/>
+              </p:ext>
+            </p:extLst>
+          </p:nvPr>
+        </p:nvSpPr>
+        <p:spPr>
+          <a:xfrm>
+            <a:off x="0" y="0"/>
+            <a:ext cx="12191999" cy="6857365"/>
+          </a:xfrm>
+          <a:prstGeom prst="rect">
+            <a:avLst/>
+          </a:prstGeom>
+          <a:ln>
+            <a:noFill/>
+          </a:ln>
+        </p:spPr>
+        <p:style>
+          <a:lnRef idx="2">
+            <a:schemeClr val="accent1">
+              <a:shade val="50000"/>
+            </a:schemeClr>
+          </a:lnRef>
+          <a:fillRef idx="1">
+            <a:schemeClr val="accent1"/>
+          </a:fillRef>
+          <a:effectRef idx="0">
+            <a:schemeClr val="accent1"/>
+          </a:effectRef>
+          <a:fontRef idx="minor">
+            <a:schemeClr val="lt1"/>
+          </a:fontRef>
+        </p:style>
+        <p:txBody>
+          <a:bodyPr rtlCol="0" anchor="ctr"/>
+          <a:lstStyle/>
+          <a:p>
+            <a:pPr algn="ctr"/>
+            <a:endParaRPr lang="en-US"/>
+          </a:p>
+        </p:txBody>
+      </p:sp>
+      <p:sp>
+        <p:nvSpPr>
+          <p:cNvPr id="2" name="Title 1">
+            <a:extLst>
+              <a:ext uri="{FF2B5EF4-FFF2-40B4-BE49-F238E27FC236}">
+                <a16:creationId xmlns:a16="http://schemas.microsoft.com/office/drawing/2014/main" id="{37927443-133F-1E46-BDFF-EDF0DF44E591}"/>
+              </a:ext>
+            </a:extLst>
+          </p:cNvPr>
+          <p:cNvSpPr>
+            <a:spLocks noGrp="1"/>
+          </p:cNvSpPr>
+          <p:nvPr>
+            <p:ph type="title"/>
+          </p:nvPr>
+        </p:nvSpPr>
+        <p:spPr>
+          <a:xfrm>
+            <a:off x="808638" y="386930"/>
+            <a:ext cx="9236700" cy="1188950"/>
+          </a:xfrm>
+        </p:spPr>
+        <p:txBody>
+          <a:bodyPr anchor="b">
+            <a:normAutofit/>
+          </a:bodyPr>
+          <a:lstStyle/>
+          <a:p>
+            <a:r>
+              <a:rPr lang="en-US" sz="5400" dirty="0"/>
+              <a:t>Next Steps</a:t>
+            </a:r>
+          </a:p>
+        </p:txBody>
+      </p:sp>
+      <p:grpSp>
+        <p:nvGrpSpPr>
+          <p:cNvPr id="10" name="Group 9">
+            <a:extLst>
+              <a:ext uri="{FF2B5EF4-FFF2-40B4-BE49-F238E27FC236}">
+                <a16:creationId xmlns:a16="http://schemas.microsoft.com/office/drawing/2014/main" id="{28FAF094-D087-493F-8DF9-A486C2D6BBAA}"/>
+              </a:ext>
+              <a:ext uri="{C183D7F6-B498-43B3-948B-1728B52AA6E4}">
+                <adec:decorative xmlns:adec="http://schemas.microsoft.com/office/drawing/2017/decorative" val="1"/>
+              </a:ext>
+            </a:extLst>
+          </p:cNvPr>
+          <p:cNvGrpSpPr>
+            <a:grpSpLocks noGrp="1" noUngrp="1" noRot="1" noChangeAspect="1" noMove="1" noResize="1"/>
+          </p:cNvGrpSpPr>
+          <p:nvPr>
+            <p:extLst>
+              <p:ext uri="{386F3935-93C4-4BCD-93E2-E3B085C9AB24}">
+                <p16:designElem xmlns:p16="http://schemas.microsoft.com/office/powerpoint/2015/main" val="1"/>
+              </p:ext>
+            </p:extLst>
+          </p:nvPr>
+        </p:nvGrpSpPr>
+        <p:grpSpPr>
+          <a:xfrm>
+            <a:off x="-2" y="1998368"/>
+            <a:ext cx="11695083" cy="782176"/>
+            <a:chOff x="-2" y="1998368"/>
+            <a:chExt cx="11695083" cy="782176"/>
+          </a:xfrm>
+        </p:grpSpPr>
+        <p:sp>
+          <p:nvSpPr>
+            <p:cNvPr id="21" name="Rectangle 10">
+              <a:extLst>
+                <a:ext uri="{FF2B5EF4-FFF2-40B4-BE49-F238E27FC236}">
+                  <a16:creationId xmlns:a16="http://schemas.microsoft.com/office/drawing/2014/main" id="{8D7C88D8-5509-4514-925A-9CE148E5CBD6}"/>
+                </a:ext>
+                <a:ext uri="{C183D7F6-B498-43B3-948B-1728B52AA6E4}">
+                  <adec:decorative xmlns:adec="http://schemas.microsoft.com/office/drawing/2017/decorative" val="1"/>
+                </a:ext>
+              </a:extLst>
+            </p:cNvPr>
+            <p:cNvSpPr/>
+            <p:nvPr>
+              <p:extLst>
+                <p:ext uri="{386F3935-93C4-4BCD-93E2-E3B085C9AB24}">
+                  <p16:designElem xmlns:p16="http://schemas.microsoft.com/office/powerpoint/2015/main" val="1"/>
+                </p:ext>
+              </p:extLst>
+            </p:nvPr>
+          </p:nvSpPr>
+          <p:spPr>
+            <a:xfrm rot="5400000">
+              <a:off x="11228040" y="2313027"/>
+              <a:ext cx="781700" cy="152382"/>
+            </a:xfrm>
+            <a:prstGeom prst="rect">
+              <a:avLst/>
+            </a:prstGeom>
+            <a:solidFill>
+              <a:schemeClr val="accent4"/>
+            </a:solidFill>
+            <a:ln>
+              <a:noFill/>
+            </a:ln>
+          </p:spPr>
+          <p:style>
+            <a:lnRef idx="2">
+              <a:schemeClr val="accent1">
+                <a:shade val="50000"/>
+              </a:schemeClr>
+            </a:lnRef>
+            <a:fillRef idx="1">
+              <a:schemeClr val="accent1"/>
+            </a:fillRef>
+            <a:effectRef idx="0">
+              <a:schemeClr val="accent1"/>
+            </a:effectRef>
+            <a:fontRef idx="minor">
+              <a:schemeClr val="lt1"/>
+            </a:fontRef>
+          </p:style>
+          <p:txBody>
+            <a:bodyPr rtlCol="0" anchor="ctr"/>
+            <a:lstStyle/>
+            <a:p>
+              <a:pPr algn="ctr"/>
+              <a:endParaRPr lang="en-US"/>
+            </a:p>
+          </p:txBody>
+        </p:sp>
+        <p:sp>
+          <p:nvSpPr>
+            <p:cNvPr id="12" name="Rectangle 11">
+              <a:extLst>
+                <a:ext uri="{FF2B5EF4-FFF2-40B4-BE49-F238E27FC236}">
+                  <a16:creationId xmlns:a16="http://schemas.microsoft.com/office/drawing/2014/main" id="{7275593D-F75E-4426-AE3E-2CDEFD228D25}"/>
+                </a:ext>
+                <a:ext uri="{C183D7F6-B498-43B3-948B-1728B52AA6E4}">
+                  <adec:decorative xmlns:adec="http://schemas.microsoft.com/office/drawing/2017/decorative" val="1"/>
+                </a:ext>
+              </a:extLst>
+            </p:cNvPr>
+            <p:cNvSpPr/>
+            <p:nvPr>
+              <p:extLst>
+                <p:ext uri="{386F3935-93C4-4BCD-93E2-E3B085C9AB24}">
+                  <p16:designElem xmlns:p16="http://schemas.microsoft.com/office/powerpoint/2015/main" val="1"/>
+                </p:ext>
+              </p:extLst>
+            </p:nvPr>
+          </p:nvSpPr>
+          <p:spPr>
+            <a:xfrm flipH="1" flipV="1">
+              <a:off x="-2" y="1998845"/>
+              <a:ext cx="11454595" cy="781699"/>
+            </a:xfrm>
+            <a:prstGeom prst="rect">
+              <a:avLst/>
+            </a:prstGeom>
+            <a:solidFill>
+              <a:schemeClr val="accent4"/>
+            </a:solidFill>
+            <a:ln>
+              <a:noFill/>
+            </a:ln>
+          </p:spPr>
+          <p:style>
+            <a:lnRef idx="2">
+              <a:schemeClr val="accent1">
+                <a:shade val="50000"/>
+              </a:schemeClr>
+            </a:lnRef>
+            <a:fillRef idx="1">
+              <a:schemeClr val="accent1"/>
+            </a:fillRef>
+            <a:effectRef idx="0">
+              <a:schemeClr val="accent1"/>
+            </a:effectRef>
+            <a:fontRef idx="minor">
+              <a:schemeClr val="lt1"/>
+            </a:fontRef>
+          </p:style>
+          <p:txBody>
+            <a:bodyPr rtlCol="0" anchor="ctr"/>
+            <a:lstStyle/>
+            <a:p>
+              <a:pPr algn="ctr"/>
+              <a:endParaRPr lang="en-US"/>
+            </a:p>
+          </p:txBody>
+        </p:sp>
+      </p:grpSp>
+      <p:sp>
+        <p:nvSpPr>
+          <p:cNvPr id="14" name="Rectangle 13">
+            <a:extLst>
+              <a:ext uri="{FF2B5EF4-FFF2-40B4-BE49-F238E27FC236}">
+                <a16:creationId xmlns:a16="http://schemas.microsoft.com/office/drawing/2014/main" id="{E659831F-0D9A-4C63-9EBB-8435B85A440F}"/>
+              </a:ext>
+              <a:ext uri="{C183D7F6-B498-43B3-948B-1728B52AA6E4}">
+                <adec:decorative xmlns:adec="http://schemas.microsoft.com/office/drawing/2017/decorative" val="1"/>
+              </a:ext>
+            </a:extLst>
+          </p:cNvPr>
+          <p:cNvSpPr>
+            <a:spLocks noGrp="1" noRot="1" noChangeAspect="1" noMove="1" noResize="1" noEditPoints="1" noAdjustHandles="1" noChangeArrowheads="1" noChangeShapeType="1" noTextEdit="1"/>
+          </p:cNvSpPr>
+          <p:nvPr>
+            <p:extLst>
+              <p:ext uri="{386F3935-93C4-4BCD-93E2-E3B085C9AB24}">
+                <p16:designElem xmlns:p16="http://schemas.microsoft.com/office/powerpoint/2015/main" val="1"/>
+              </p:ext>
+            </p:extLst>
+          </p:nvPr>
+        </p:nvSpPr>
+        <p:spPr>
+          <a:xfrm>
+            <a:off x="0" y="2203079"/>
+            <a:ext cx="11383362" cy="4147845"/>
+          </a:xfrm>
+          <a:prstGeom prst="rect">
+            <a:avLst/>
+          </a:prstGeom>
+          <a:solidFill>
+            <a:schemeClr val="bg1"/>
+          </a:solidFill>
+          <a:ln>
+            <a:noFill/>
+          </a:ln>
+          <a:effectLst>
+            <a:outerShdw blurRad="139700" dist="127000" dir="5400000" algn="t" rotWithShape="0">
+              <a:prstClr val="black">
+                <a:alpha val="15000"/>
+              </a:prstClr>
+            </a:outerShdw>
+          </a:effectLst>
+        </p:spPr>
+        <p:style>
+          <a:lnRef idx="2">
+            <a:schemeClr val="accent1">
+              <a:shade val="50000"/>
+            </a:schemeClr>
+          </a:lnRef>
+          <a:fillRef idx="1">
+            <a:schemeClr val="accent1"/>
+          </a:fillRef>
+          <a:effectRef idx="0">
+            <a:schemeClr val="accent1"/>
+          </a:effectRef>
+          <a:fontRef idx="minor">
+            <a:schemeClr val="lt1"/>
+          </a:fontRef>
+        </p:style>
+        <p:txBody>
+          <a:bodyPr rtlCol="0" anchor="ctr"/>
+          <a:lstStyle/>
+          <a:p>
+            <a:pPr algn="ctr"/>
+            <a:endParaRPr lang="en-US"/>
+          </a:p>
+        </p:txBody>
+      </p:sp>
+      <p:sp>
+        <p:nvSpPr>
+          <p:cNvPr id="3" name="Content Placeholder 2">
+            <a:extLst>
+              <a:ext uri="{FF2B5EF4-FFF2-40B4-BE49-F238E27FC236}">
+                <a16:creationId xmlns:a16="http://schemas.microsoft.com/office/drawing/2014/main" id="{6E0CDA4C-02EB-D64B-A2DD-A803BE520CEA}"/>
+              </a:ext>
+            </a:extLst>
+          </p:cNvPr>
+          <p:cNvSpPr>
+            <a:spLocks noGrp="1"/>
+          </p:cNvSpPr>
+          <p:nvPr>
+            <p:ph idx="1"/>
+          </p:nvPr>
+        </p:nvSpPr>
+        <p:spPr>
+          <a:xfrm>
+            <a:off x="793660" y="2599509"/>
+            <a:ext cx="10143668" cy="3435531"/>
+          </a:xfrm>
+        </p:spPr>
+        <p:txBody>
+          <a:bodyPr anchor="ctr">
+            <a:normAutofit/>
+          </a:bodyPr>
+          <a:lstStyle/>
+          <a:p>
+            <a:r>
+              <a:rPr lang="en-US" sz="2400" dirty="0"/>
+              <a:t>Does this model seem justified / appropriate?</a:t>
+            </a:r>
+          </a:p>
+          <a:p>
+            <a:r>
+              <a:rPr lang="en-US" sz="2400" dirty="0"/>
+              <a:t>Validate model </a:t>
+            </a:r>
+          </a:p>
+          <a:p>
+            <a:pPr lvl="1"/>
+            <a:r>
+              <a:rPr lang="en-US" dirty="0"/>
+              <a:t>What is the best way to do this?</a:t>
+            </a:r>
+          </a:p>
+          <a:p>
+            <a:pPr lvl="1"/>
+            <a:r>
+              <a:rPr lang="en-US" dirty="0"/>
+              <a:t>Compare to existing models in lit?</a:t>
+            </a:r>
+          </a:p>
+          <a:p>
+            <a:r>
+              <a:rPr lang="en-US" sz="2400" dirty="0"/>
+              <a:t>Quantify model drift – if not feasible, consider adding to manuscript </a:t>
+            </a:r>
+          </a:p>
+          <a:p>
+            <a:r>
+              <a:rPr lang="en-US" sz="2400" dirty="0"/>
+              <a:t>What would make this publishable?</a:t>
+            </a:r>
+          </a:p>
+          <a:p>
+            <a:r>
+              <a:rPr lang="en-US" sz="2400" dirty="0"/>
+              <a:t>So what? What value would this paper add?</a:t>
+            </a:r>
+          </a:p>
+        </p:txBody>
+      </p:sp>
+    </p:spTree>
+    <p:extLst>
+      <p:ext uri="{BB962C8B-B14F-4D97-AF65-F5344CB8AC3E}">
+        <p14:creationId xmlns:p14="http://schemas.microsoft.com/office/powerpoint/2010/main" val="1348293864"/>
+      </p:ext>
+    </p:extLst>
+  </p:cSld>
+  <p:clrMapOvr>
+    <a:masterClrMapping/>
+  </p:clrMapOvr>
+</p:sld>
+</file>
+
+<file path=ppt/slides/slide16.xml><?xml version="1.0" encoding="utf-8"?>
+<p:sld xmlns:a="http://schemas.openxmlformats.org/drawingml/2006/main" xmlns:r="http://schemas.openxmlformats.org/officeDocument/2006/relationships" xmlns:p="http://schemas.openxmlformats.org/presentationml/2006/main">
+  <p:cSld>
+    <p:spTree>
+      <p:nvGrpSpPr>
+        <p:cNvPr id="1" name=""/>
+        <p:cNvGrpSpPr/>
+        <p:nvPr/>
+      </p:nvGrpSpPr>
+      <p:grpSpPr>
+        <a:xfrm>
+          <a:off x="0" y="0"/>
+          <a:ext cx="0" cy="0"/>
+          <a:chOff x="0" y="0"/>
+          <a:chExt cx="0" cy="0"/>
+        </a:xfrm>
+      </p:grpSpPr>
+    </p:spTree>
+    <p:extLst>
+      <p:ext uri="{BB962C8B-B14F-4D97-AF65-F5344CB8AC3E}">
+        <p14:creationId xmlns:p14="http://schemas.microsoft.com/office/powerpoint/2010/main" val="2752025400"/>
+      </p:ext>
+    </p:extLst>
+  </p:cSld>
+  <p:clrMapOvr>
+    <a:masterClrMapping/>
+  </p:clrMapOvr>
+</p:sld>
+</file>
+
+<file path=ppt/slides/slide17.xml><?xml version="1.0" encoding="utf-8"?>
+<p:sld xmlns:a="http://schemas.openxmlformats.org/drawingml/2006/main" xmlns:r="http://schemas.openxmlformats.org/officeDocument/2006/relationships" xmlns:p="http://schemas.openxmlformats.org/presentationml/2006/main">
+  <p:cSld>
+    <p:spTree>
+      <p:nvGrpSpPr>
+        <p:cNvPr id="1" name=""/>
+        <p:cNvGrpSpPr/>
+        <p:nvPr/>
+      </p:nvGrpSpPr>
+      <p:grpSpPr>
+        <a:xfrm>
+          <a:off x="0" y="0"/>
+          <a:ext cx="0" cy="0"/>
+          <a:chOff x="0" y="0"/>
+          <a:chExt cx="0" cy="0"/>
+        </a:xfrm>
+      </p:grpSpPr>
+      <p:sp>
+        <p:nvSpPr>
+          <p:cNvPr id="2" name="Title 1">
+            <a:extLst>
+              <a:ext uri="{FF2B5EF4-FFF2-40B4-BE49-F238E27FC236}">
+                <a16:creationId xmlns:a16="http://schemas.microsoft.com/office/drawing/2014/main" id="{CAA870E8-F0C1-0E42-BE4D-C0B171A8AAF8}"/>
+              </a:ext>
+            </a:extLst>
+          </p:cNvPr>
+          <p:cNvSpPr>
+            <a:spLocks noGrp="1"/>
+          </p:cNvSpPr>
+          <p:nvPr>
+            <p:ph type="title"/>
+          </p:nvPr>
+        </p:nvSpPr>
+        <p:spPr>
+          <a:xfrm>
+            <a:off x="2685221" y="2432464"/>
+            <a:ext cx="6821557" cy="1325563"/>
+          </a:xfrm>
+        </p:spPr>
+        <p:txBody>
+          <a:bodyPr/>
+          <a:lstStyle/>
+          <a:p>
+            <a:pPr algn="ctr"/>
+            <a:r>
+              <a:rPr lang="en-US" dirty="0"/>
+              <a:t>Extra Slides </a:t>
+            </a:r>
+          </a:p>
+        </p:txBody>
+      </p:sp>
+    </p:spTree>
+    <p:extLst>
+      <p:ext uri="{BB962C8B-B14F-4D97-AF65-F5344CB8AC3E}">
+        <p14:creationId xmlns:p14="http://schemas.microsoft.com/office/powerpoint/2010/main" val="3570729708"/>
+      </p:ext>
+    </p:extLst>
+  </p:cSld>
+  <p:clrMapOvr>
+    <a:masterClrMapping/>
+  </p:clrMapOvr>
+</p:sld>
+</file>
+
+<file path=ppt/slides/slide18.xml><?xml version="1.0" encoding="utf-8"?>
 <p:sld xmlns:a="http://schemas.openxmlformats.org/drawingml/2006/main" xmlns:r="http://schemas.openxmlformats.org/officeDocument/2006/relationships" xmlns:p="http://schemas.openxmlformats.org/presentationml/2006/main">
   <p:cSld>
     <p:bg>
@@ -14654,7 +15409,7 @@
 </p:sld>
 </file>
 
-<file path=ppt/slides/slide16.xml><?xml version="1.0" encoding="utf-8"?>
+<file path=ppt/slides/slide19.xml><?xml version="1.0" encoding="utf-8"?>
 <p:sld xmlns:a="http://schemas.openxmlformats.org/drawingml/2006/main" xmlns:r="http://schemas.openxmlformats.org/officeDocument/2006/relationships" xmlns:p="http://schemas.openxmlformats.org/presentationml/2006/main">
   <p:cSld>
     <p:bg>
@@ -15529,177 +16284,6 @@
 </p:sld>
 </file>
 
-<file path=ppt/slides/slide17.xml><?xml version="1.0" encoding="utf-8"?>
-<p:sld xmlns:a="http://schemas.openxmlformats.org/drawingml/2006/main" xmlns:r="http://schemas.openxmlformats.org/officeDocument/2006/relationships" xmlns:p="http://schemas.openxmlformats.org/presentationml/2006/main">
-  <p:cSld>
-    <p:bg>
-      <p:bgPr>
-        <a:solidFill>
-          <a:schemeClr val="bg1"/>
-        </a:solidFill>
-        <a:effectLst/>
-      </p:bgPr>
-    </p:bg>
-    <p:spTree>
-      <p:nvGrpSpPr>
-        <p:cNvPr id="1" name=""/>
-        <p:cNvGrpSpPr/>
-        <p:nvPr/>
-      </p:nvGrpSpPr>
-      <p:grpSpPr>
-        <a:xfrm>
-          <a:off x="0" y="0"/>
-          <a:ext cx="0" cy="0"/>
-          <a:chOff x="0" y="0"/>
-          <a:chExt cx="0" cy="0"/>
-        </a:xfrm>
-      </p:grpSpPr>
-      <p:sp>
-        <p:nvSpPr>
-          <p:cNvPr id="9" name="Rectangle 8">
-            <a:extLst>
-              <a:ext uri="{FF2B5EF4-FFF2-40B4-BE49-F238E27FC236}">
-                <a16:creationId xmlns:a16="http://schemas.microsoft.com/office/drawing/2014/main" id="{B819A166-7571-4003-A6B8-B62034C3ED30}"/>
-              </a:ext>
-              <a:ext uri="{C183D7F6-B498-43B3-948B-1728B52AA6E4}">
-                <adec:decorative xmlns:adec="http://schemas.microsoft.com/office/drawing/2017/decorative" val="1"/>
-              </a:ext>
-            </a:extLst>
-          </p:cNvPr>
-          <p:cNvSpPr>
-            <a:spLocks noGrp="1" noRot="1" noChangeAspect="1" noMove="1" noResize="1" noEditPoints="1" noAdjustHandles="1" noChangeArrowheads="1" noChangeShapeType="1" noTextEdit="1"/>
-          </p:cNvSpPr>
-          <p:nvPr>
-            <p:extLst>
-              <p:ext uri="{386F3935-93C4-4BCD-93E2-E3B085C9AB24}">
-                <p16:designElem xmlns:p16="http://schemas.microsoft.com/office/powerpoint/2015/main" val="1"/>
-              </p:ext>
-            </p:extLst>
-          </p:nvPr>
-        </p:nvSpPr>
-        <p:spPr>
-          <a:xfrm>
-            <a:off x="-1" y="0"/>
-            <a:ext cx="5093209" cy="6858000"/>
-          </a:xfrm>
-          <a:prstGeom prst="rect">
-            <a:avLst/>
-          </a:prstGeom>
-          <a:solidFill>
-            <a:schemeClr val="accent1"/>
-          </a:solidFill>
-          <a:ln>
-            <a:noFill/>
-          </a:ln>
-        </p:spPr>
-        <p:style>
-          <a:lnRef idx="2">
-            <a:schemeClr val="accent1">
-              <a:shade val="50000"/>
-            </a:schemeClr>
-          </a:lnRef>
-          <a:fillRef idx="1">
-            <a:schemeClr val="accent1"/>
-          </a:fillRef>
-          <a:effectRef idx="0">
-            <a:schemeClr val="accent1"/>
-          </a:effectRef>
-          <a:fontRef idx="minor">
-            <a:schemeClr val="lt1"/>
-          </a:fontRef>
-        </p:style>
-        <p:txBody>
-          <a:bodyPr rtlCol="0" anchor="ctr"/>
-          <a:lstStyle/>
-          <a:p>
-            <a:pPr algn="ctr"/>
-            <a:endParaRPr lang="en-US" dirty="0"/>
-          </a:p>
-        </p:txBody>
-      </p:sp>
-      <p:sp>
-        <p:nvSpPr>
-          <p:cNvPr id="2" name="Title 1">
-            <a:extLst>
-              <a:ext uri="{FF2B5EF4-FFF2-40B4-BE49-F238E27FC236}">
-                <a16:creationId xmlns:a16="http://schemas.microsoft.com/office/drawing/2014/main" id="{FDC0AD12-DE3E-EF4E-BCF7-51E3EA2C9888}"/>
-              </a:ext>
-            </a:extLst>
-          </p:cNvPr>
-          <p:cNvSpPr>
-            <a:spLocks noGrp="1"/>
-          </p:cNvSpPr>
-          <p:nvPr>
-            <p:ph type="title"/>
-          </p:nvPr>
-        </p:nvSpPr>
-        <p:spPr>
-          <a:xfrm>
-            <a:off x="524741" y="620392"/>
-            <a:ext cx="3808268" cy="5504688"/>
-          </a:xfrm>
-        </p:spPr>
-        <p:txBody>
-          <a:bodyPr>
-            <a:normAutofit/>
-          </a:bodyPr>
-          <a:lstStyle/>
-          <a:p>
-            <a:r>
-              <a:rPr lang="en-US" sz="6000" dirty="0">
-                <a:solidFill>
-                  <a:schemeClr val="bg1"/>
-                </a:solidFill>
-              </a:rPr>
-              <a:t>Calculate Brier Score for Models 1 – 4</a:t>
-            </a:r>
-          </a:p>
-        </p:txBody>
-      </p:sp>
-      <p:graphicFrame>
-        <p:nvGraphicFramePr>
-          <p:cNvPr id="7" name="Content Placeholder 2">
-            <a:extLst>
-              <a:ext uri="{FF2B5EF4-FFF2-40B4-BE49-F238E27FC236}">
-                <a16:creationId xmlns:a16="http://schemas.microsoft.com/office/drawing/2014/main" id="{0915DF86-6F6B-4DDB-B69A-613D3D1354B3}"/>
-              </a:ext>
-            </a:extLst>
-          </p:cNvPr>
-          <p:cNvGraphicFramePr>
-            <a:graphicFrameLocks noGrp="1"/>
-          </p:cNvGraphicFramePr>
-          <p:nvPr>
-            <p:ph idx="1"/>
-            <p:extLst>
-              <p:ext uri="{D42A27DB-BD31-4B8C-83A1-F6EECF244321}">
-                <p14:modId xmlns:p14="http://schemas.microsoft.com/office/powerpoint/2010/main" val="3909028317"/>
-              </p:ext>
-            </p:extLst>
-          </p:nvPr>
-        </p:nvGraphicFramePr>
-        <p:xfrm>
-          <a:off x="5468389" y="620392"/>
-          <a:ext cx="6263640" cy="5504688"/>
-        </p:xfrm>
-        <a:graphic>
-          <a:graphicData uri="http://schemas.openxmlformats.org/drawingml/2006/diagram">
-            <dgm:relIds xmlns:dgm="http://schemas.openxmlformats.org/drawingml/2006/diagram" xmlns:r="http://schemas.openxmlformats.org/officeDocument/2006/relationships" r:dm="rId3" r:lo="rId4" r:qs="rId5" r:cs="rId6"/>
-          </a:graphicData>
-        </a:graphic>
-      </p:graphicFrame>
-    </p:spTree>
-    <p:extLst>
-      <p:ext uri="{BB962C8B-B14F-4D97-AF65-F5344CB8AC3E}">
-        <p14:creationId xmlns:p14="http://schemas.microsoft.com/office/powerpoint/2010/main" val="1314269523"/>
-      </p:ext>
-    </p:extLst>
-  </p:cSld>
-  <p:clrMapOvr>
-    <a:masterClrMapping/>
-  </p:clrMapOvr>
-</p:sld>
-</file>
-
 <file path=ppt/slides/slide2.xml><?xml version="1.0" encoding="utf-8"?>
 <p:sld xmlns:a="http://schemas.openxmlformats.org/drawingml/2006/main" xmlns:r="http://schemas.openxmlformats.org/officeDocument/2006/relationships" xmlns:p="http://schemas.openxmlformats.org/presentationml/2006/main">
   <p:cSld>
@@ -15968,7 +16552,7 @@
         <p:spPr>
           <a:xfrm>
             <a:off x="1186386" y="2368952"/>
-            <a:ext cx="9082079" cy="3484335"/>
+            <a:ext cx="9082079" cy="3676555"/>
           </a:xfrm>
         </p:spPr>
         <p:txBody>
@@ -15991,7 +16575,7 @@
           <a:p>
             <a:r>
               <a:rPr lang="en-US" sz="2400" dirty="0"/>
-              <a:t>Parsed UCSF EHR data for selected parameters</a:t>
+              <a:t>Parsed the following UCSF EHR data for selected parameters: </a:t>
             </a:r>
           </a:p>
           <a:p>
@@ -16036,7 +16620,15 @@
           <a:p>
             <a:r>
               <a:rPr lang="en-US" sz="2400" dirty="0"/>
-              <a:t>Compared model performance</a:t>
+              <a:t>Evaluated model performance via AIC, R</a:t>
+            </a:r>
+            <a:r>
+              <a:rPr lang="en-US" sz="2400" baseline="30000" dirty="0"/>
+              <a:t>2</a:t>
+            </a:r>
+            <a:r>
+              <a:rPr lang="en-US" sz="2400" dirty="0"/>
+              <a:t>, Brier Score, etc.</a:t>
             </a:r>
           </a:p>
         </p:txBody>
@@ -16045,6 +16637,177 @@
     <p:extLst>
       <p:ext uri="{BB962C8B-B14F-4D97-AF65-F5344CB8AC3E}">
         <p14:creationId xmlns:p14="http://schemas.microsoft.com/office/powerpoint/2010/main" val="1734158062"/>
+      </p:ext>
+    </p:extLst>
+  </p:cSld>
+  <p:clrMapOvr>
+    <a:masterClrMapping/>
+  </p:clrMapOvr>
+</p:sld>
+</file>
+
+<file path=ppt/slides/slide20.xml><?xml version="1.0" encoding="utf-8"?>
+<p:sld xmlns:a="http://schemas.openxmlformats.org/drawingml/2006/main" xmlns:r="http://schemas.openxmlformats.org/officeDocument/2006/relationships" xmlns:p="http://schemas.openxmlformats.org/presentationml/2006/main">
+  <p:cSld>
+    <p:bg>
+      <p:bgPr>
+        <a:solidFill>
+          <a:schemeClr val="bg1"/>
+        </a:solidFill>
+        <a:effectLst/>
+      </p:bgPr>
+    </p:bg>
+    <p:spTree>
+      <p:nvGrpSpPr>
+        <p:cNvPr id="1" name=""/>
+        <p:cNvGrpSpPr/>
+        <p:nvPr/>
+      </p:nvGrpSpPr>
+      <p:grpSpPr>
+        <a:xfrm>
+          <a:off x="0" y="0"/>
+          <a:ext cx="0" cy="0"/>
+          <a:chOff x="0" y="0"/>
+          <a:chExt cx="0" cy="0"/>
+        </a:xfrm>
+      </p:grpSpPr>
+      <p:sp>
+        <p:nvSpPr>
+          <p:cNvPr id="9" name="Rectangle 8">
+            <a:extLst>
+              <a:ext uri="{FF2B5EF4-FFF2-40B4-BE49-F238E27FC236}">
+                <a16:creationId xmlns:a16="http://schemas.microsoft.com/office/drawing/2014/main" id="{B819A166-7571-4003-A6B8-B62034C3ED30}"/>
+              </a:ext>
+              <a:ext uri="{C183D7F6-B498-43B3-948B-1728B52AA6E4}">
+                <adec:decorative xmlns:adec="http://schemas.microsoft.com/office/drawing/2017/decorative" val="1"/>
+              </a:ext>
+            </a:extLst>
+          </p:cNvPr>
+          <p:cNvSpPr>
+            <a:spLocks noGrp="1" noRot="1" noChangeAspect="1" noMove="1" noResize="1" noEditPoints="1" noAdjustHandles="1" noChangeArrowheads="1" noChangeShapeType="1" noTextEdit="1"/>
+          </p:cNvSpPr>
+          <p:nvPr>
+            <p:extLst>
+              <p:ext uri="{386F3935-93C4-4BCD-93E2-E3B085C9AB24}">
+                <p16:designElem xmlns:p16="http://schemas.microsoft.com/office/powerpoint/2015/main" val="1"/>
+              </p:ext>
+            </p:extLst>
+          </p:nvPr>
+        </p:nvSpPr>
+        <p:spPr>
+          <a:xfrm>
+            <a:off x="-1" y="0"/>
+            <a:ext cx="5093209" cy="6858000"/>
+          </a:xfrm>
+          <a:prstGeom prst="rect">
+            <a:avLst/>
+          </a:prstGeom>
+          <a:solidFill>
+            <a:schemeClr val="accent1"/>
+          </a:solidFill>
+          <a:ln>
+            <a:noFill/>
+          </a:ln>
+        </p:spPr>
+        <p:style>
+          <a:lnRef idx="2">
+            <a:schemeClr val="accent1">
+              <a:shade val="50000"/>
+            </a:schemeClr>
+          </a:lnRef>
+          <a:fillRef idx="1">
+            <a:schemeClr val="accent1"/>
+          </a:fillRef>
+          <a:effectRef idx="0">
+            <a:schemeClr val="accent1"/>
+          </a:effectRef>
+          <a:fontRef idx="minor">
+            <a:schemeClr val="lt1"/>
+          </a:fontRef>
+        </p:style>
+        <p:txBody>
+          <a:bodyPr rtlCol="0" anchor="ctr"/>
+          <a:lstStyle/>
+          <a:p>
+            <a:pPr algn="ctr"/>
+            <a:endParaRPr lang="en-US" dirty="0"/>
+          </a:p>
+        </p:txBody>
+      </p:sp>
+      <p:sp>
+        <p:nvSpPr>
+          <p:cNvPr id="2" name="Title 1">
+            <a:extLst>
+              <a:ext uri="{FF2B5EF4-FFF2-40B4-BE49-F238E27FC236}">
+                <a16:creationId xmlns:a16="http://schemas.microsoft.com/office/drawing/2014/main" id="{FDC0AD12-DE3E-EF4E-BCF7-51E3EA2C9888}"/>
+              </a:ext>
+            </a:extLst>
+          </p:cNvPr>
+          <p:cNvSpPr>
+            <a:spLocks noGrp="1"/>
+          </p:cNvSpPr>
+          <p:nvPr>
+            <p:ph type="title"/>
+          </p:nvPr>
+        </p:nvSpPr>
+        <p:spPr>
+          <a:xfrm>
+            <a:off x="524741" y="620392"/>
+            <a:ext cx="3808268" cy="5504688"/>
+          </a:xfrm>
+        </p:spPr>
+        <p:txBody>
+          <a:bodyPr>
+            <a:normAutofit/>
+          </a:bodyPr>
+          <a:lstStyle/>
+          <a:p>
+            <a:r>
+              <a:rPr lang="en-US" sz="6000" dirty="0">
+                <a:solidFill>
+                  <a:schemeClr val="bg1"/>
+                </a:solidFill>
+              </a:rPr>
+              <a:t>Calculate Brier Score for Models 1 – 4</a:t>
+            </a:r>
+          </a:p>
+        </p:txBody>
+      </p:sp>
+      <p:graphicFrame>
+        <p:nvGraphicFramePr>
+          <p:cNvPr id="7" name="Content Placeholder 2">
+            <a:extLst>
+              <a:ext uri="{FF2B5EF4-FFF2-40B4-BE49-F238E27FC236}">
+                <a16:creationId xmlns:a16="http://schemas.microsoft.com/office/drawing/2014/main" id="{0915DF86-6F6B-4DDB-B69A-613D3D1354B3}"/>
+              </a:ext>
+            </a:extLst>
+          </p:cNvPr>
+          <p:cNvGraphicFramePr>
+            <a:graphicFrameLocks noGrp="1"/>
+          </p:cNvGraphicFramePr>
+          <p:nvPr>
+            <p:ph idx="1"/>
+            <p:extLst>
+              <p:ext uri="{D42A27DB-BD31-4B8C-83A1-F6EECF244321}">
+                <p14:modId xmlns:p14="http://schemas.microsoft.com/office/powerpoint/2010/main" val="3909028317"/>
+              </p:ext>
+            </p:extLst>
+          </p:nvPr>
+        </p:nvGraphicFramePr>
+        <p:xfrm>
+          <a:off x="5468389" y="620392"/>
+          <a:ext cx="6263640" cy="5504688"/>
+        </p:xfrm>
+        <a:graphic>
+          <a:graphicData uri="http://schemas.openxmlformats.org/drawingml/2006/diagram">
+            <dgm:relIds xmlns:dgm="http://schemas.openxmlformats.org/drawingml/2006/diagram" xmlns:r="http://schemas.openxmlformats.org/officeDocument/2006/relationships" r:dm="rId3" r:lo="rId4" r:qs="rId5" r:cs="rId6"/>
+          </a:graphicData>
+        </a:graphic>
+      </p:graphicFrame>
+    </p:spTree>
+    <p:extLst>
+      <p:ext uri="{BB962C8B-B14F-4D97-AF65-F5344CB8AC3E}">
+        <p14:creationId xmlns:p14="http://schemas.microsoft.com/office/powerpoint/2010/main" val="1314269523"/>
       </p:ext>
     </p:extLst>
   </p:cSld>
@@ -16976,7 +17739,7 @@
             <a:pPr algn="ctr"/>
             <a:r>
               <a:rPr lang="en-US" i="1" dirty="0"/>
-              <a:t>All data were coded into binary indicator variables, where 1=YES and 0=NO</a:t>
+              <a:t>All data were coded into binary variables, where 1=YES and 0=NO</a:t>
             </a:r>
           </a:p>
         </p:txBody>
@@ -18485,10 +19248,10 @@
       </p:sp>
       <p:sp>
         <p:nvSpPr>
-          <p:cNvPr id="27" name="Right Bracket 26">
+          <p:cNvPr id="11" name="Rounded Rectangle 10">
             <a:extLst>
               <a:ext uri="{FF2B5EF4-FFF2-40B4-BE49-F238E27FC236}">
-                <a16:creationId xmlns:a16="http://schemas.microsoft.com/office/drawing/2014/main" id="{B19CDBBF-8E2C-6D43-ABC8-FAE6B73495B4}"/>
+                <a16:creationId xmlns:a16="http://schemas.microsoft.com/office/drawing/2014/main" id="{C87B7032-E0D3-A34D-B326-F41993267676}"/>
               </a:ext>
             </a:extLst>
           </p:cNvPr>
@@ -18497,26 +19260,34 @@
         </p:nvSpPr>
         <p:spPr>
           <a:xfrm>
-            <a:off x="6301946" y="2038865"/>
-            <a:ext cx="86497" cy="1390135"/>
+            <a:off x="808070" y="1510749"/>
+            <a:ext cx="5539721" cy="1918252"/>
           </a:xfrm>
-          <a:prstGeom prst="rightBracket">
+          <a:prstGeom prst="roundRect">
             <a:avLst/>
           </a:prstGeom>
-          <a:ln w="57150"/>
+          <a:noFill/>
+          <a:ln w="38100">
+            <a:solidFill>
+              <a:schemeClr val="accent4"/>
+            </a:solidFill>
+            <a:prstDash val="solid"/>
+          </a:ln>
         </p:spPr>
         <p:style>
-          <a:lnRef idx="1">
-            <a:schemeClr val="accent4"/>
+          <a:lnRef idx="2">
+            <a:schemeClr val="accent1">
+              <a:shade val="50000"/>
+            </a:schemeClr>
           </a:lnRef>
-          <a:fillRef idx="0">
-            <a:schemeClr val="accent4"/>
+          <a:fillRef idx="1">
+            <a:schemeClr val="accent1"/>
           </a:fillRef>
           <a:effectRef idx="0">
-            <a:schemeClr val="accent4"/>
+            <a:schemeClr val="accent1"/>
           </a:effectRef>
           <a:fontRef idx="minor">
-            <a:schemeClr val="tx1"/>
+            <a:schemeClr val="lt1"/>
           </a:fontRef>
         </p:style>
         <p:txBody>
@@ -19929,10 +20700,10 @@
       </p:sp>
       <p:sp>
         <p:nvSpPr>
-          <p:cNvPr id="17" name="Right Bracket 16">
+          <p:cNvPr id="5" name="Rounded Rectangle 4">
             <a:extLst>
               <a:ext uri="{FF2B5EF4-FFF2-40B4-BE49-F238E27FC236}">
-                <a16:creationId xmlns:a16="http://schemas.microsoft.com/office/drawing/2014/main" id="{635FA450-2333-CA48-A652-955A2A33BEB5}"/>
+                <a16:creationId xmlns:a16="http://schemas.microsoft.com/office/drawing/2014/main" id="{D3286B75-E832-9C47-9857-92031443A4F8}"/>
               </a:ext>
             </a:extLst>
           </p:cNvPr>
@@ -19940,27 +20711,35 @@
           <p:nvPr/>
         </p:nvSpPr>
         <p:spPr>
-          <a:xfrm rot="5400000">
-            <a:off x="10045802" y="2244100"/>
-            <a:ext cx="135926" cy="1653111"/>
+          <a:xfrm>
+            <a:off x="9303026" y="1524000"/>
+            <a:ext cx="1637295" cy="1616765"/>
           </a:xfrm>
-          <a:prstGeom prst="rightBracket">
+          <a:prstGeom prst="roundRect">
             <a:avLst/>
           </a:prstGeom>
-          <a:ln w="57150"/>
+          <a:noFill/>
+          <a:ln w="38100">
+            <a:solidFill>
+              <a:schemeClr val="accent4"/>
+            </a:solidFill>
+            <a:prstDash val="solid"/>
+          </a:ln>
         </p:spPr>
         <p:style>
-          <a:lnRef idx="1">
-            <a:schemeClr val="accent4"/>
+          <a:lnRef idx="2">
+            <a:schemeClr val="accent1">
+              <a:shade val="50000"/>
+            </a:schemeClr>
           </a:lnRef>
-          <a:fillRef idx="0">
-            <a:schemeClr val="accent4"/>
+          <a:fillRef idx="1">
+            <a:schemeClr val="accent1"/>
           </a:fillRef>
           <a:effectRef idx="0">
-            <a:schemeClr val="accent4"/>
+            <a:schemeClr val="accent1"/>
           </a:effectRef>
           <a:fontRef idx="minor">
-            <a:schemeClr val="tx1"/>
+            <a:schemeClr val="lt1"/>
           </a:fontRef>
         </p:style>
         <p:txBody>
@@ -20130,7 +20909,7 @@
               </a:rPr>
             </a:br>
             <a:r>
-              <a:rPr lang="en-US" sz="4000" kern="1200" dirty="0">
+              <a:rPr lang="en-US" sz="3200" i="1" kern="1200" dirty="0">
                 <a:solidFill>
                   <a:schemeClr val="tx1"/>
                 </a:solidFill>
@@ -20140,6 +20919,14 @@
               </a:rPr>
               <a:t>AUROC = 0.97</a:t>
             </a:r>
+            <a:endParaRPr lang="en-US" sz="4000" i="1" kern="1200" dirty="0">
+              <a:solidFill>
+                <a:schemeClr val="tx1"/>
+              </a:solidFill>
+              <a:latin typeface="+mj-lt"/>
+              <a:ea typeface="+mj-ea"/>
+              <a:cs typeface="+mj-cs"/>
+            </a:endParaRPr>
           </a:p>
         </p:txBody>
       </p:sp>

</xml_diff>